<commit_message>
updating files for team. focus on baseR_multivaraite
</commit_message>
<xml_diff>
--- a/nfl_progress.pptx
+++ b/nfl_progress.pptx
@@ -5,7 +5,7 @@
     <p:sldMasterId id="2147483648" r:id="rId1"/>
   </p:sldMasterIdLst>
   <p:notesMasterIdLst>
-    <p:notesMasterId r:id="rId23"/>
+    <p:notesMasterId r:id="rId26"/>
   </p:notesMasterIdLst>
   <p:sldIdLst>
     <p:sldId id="256" r:id="rId2"/>
@@ -29,6 +29,9 @@
     <p:sldId id="274" r:id="rId20"/>
     <p:sldId id="275" r:id="rId21"/>
     <p:sldId id="276" r:id="rId22"/>
+    <p:sldId id="277" r:id="rId23"/>
+    <p:sldId id="278" r:id="rId24"/>
+    <p:sldId id="279" r:id="rId25"/>
   </p:sldIdLst>
   <p:sldSz cx="12192000" cy="6858000"/>
   <p:notesSz cx="6858000" cy="9144000"/>
@@ -217,7 +220,7 @@
           <a:p>
             <a:fld id="{0C38E3F7-5159-4165-ACF3-EA43F6C0117D}" type="datetimeFigureOut">
               <a:rPr lang="en-US" smtClean="0"/>
-              <a:t>10/23/2025</a:t>
+              <a:t>10/31/2025</a:t>
             </a:fld>
             <a:endParaRPr lang="en-US"/>
           </a:p>
@@ -768,6 +771,105 @@
 </p:notes>
 </file>
 
+<file path=ppt/notesSlides/notesSlide4.xml><?xml version="1.0" encoding="utf-8"?>
+<p:notes xmlns:a="http://schemas.openxmlformats.org/drawingml/2006/main" xmlns:r="http://schemas.openxmlformats.org/officeDocument/2006/relationships" xmlns:p="http://schemas.openxmlformats.org/presentationml/2006/main">
+  <p:cSld>
+    <p:spTree>
+      <p:nvGrpSpPr>
+        <p:cNvPr id="1" name=""/>
+        <p:cNvGrpSpPr/>
+        <p:nvPr/>
+      </p:nvGrpSpPr>
+      <p:grpSpPr>
+        <a:xfrm>
+          <a:off x="0" y="0"/>
+          <a:ext cx="0" cy="0"/>
+          <a:chOff x="0" y="0"/>
+          <a:chExt cx="0" cy="0"/>
+        </a:xfrm>
+      </p:grpSpPr>
+      <p:sp>
+        <p:nvSpPr>
+          <p:cNvPr id="2" name="Slide Image Placeholder 1"/>
+          <p:cNvSpPr>
+            <a:spLocks noGrp="1" noRot="1" noChangeAspect="1"/>
+          </p:cNvSpPr>
+          <p:nvPr>
+            <p:ph type="sldImg"/>
+          </p:nvPr>
+        </p:nvSpPr>
+        <p:spPr/>
+      </p:sp>
+      <p:sp>
+        <p:nvSpPr>
+          <p:cNvPr id="3" name="Notes Placeholder 2"/>
+          <p:cNvSpPr>
+            <a:spLocks noGrp="1"/>
+          </p:cNvSpPr>
+          <p:nvPr>
+            <p:ph type="body" idx="1"/>
+          </p:nvPr>
+        </p:nvSpPr>
+        <p:spPr/>
+        <p:txBody>
+          <a:bodyPr/>
+          <a:lstStyle/>
+          <a:p>
+            <a:r>
+              <a:rPr lang="en-US" dirty="0"/>
+              <a:t>X and y correlation</a:t>
+            </a:r>
+          </a:p>
+          <a:p>
+            <a:r>
+              <a:rPr lang="en-US" dirty="0"/>
+              <a:t>Fit all in a join model</a:t>
+            </a:r>
+          </a:p>
+          <a:p>
+            <a:r>
+              <a:rPr lang="en-US" dirty="0"/>
+              <a:t>(multivariate regression, x1 and y1 to improve prediction)</a:t>
+            </a:r>
+          </a:p>
+        </p:txBody>
+      </p:sp>
+      <p:sp>
+        <p:nvSpPr>
+          <p:cNvPr id="4" name="Slide Number Placeholder 3"/>
+          <p:cNvSpPr>
+            <a:spLocks noGrp="1"/>
+          </p:cNvSpPr>
+          <p:nvPr>
+            <p:ph type="sldNum" sz="quarter" idx="5"/>
+          </p:nvPr>
+        </p:nvSpPr>
+        <p:spPr/>
+        <p:txBody>
+          <a:bodyPr/>
+          <a:lstStyle/>
+          <a:p>
+            <a:fld id="{BAC07BCE-6D3A-4F0E-B78E-A42DD96BA31D}" type="slidenum">
+              <a:rPr lang="en-US" smtClean="0"/>
+              <a:t>21</a:t>
+            </a:fld>
+            <a:endParaRPr lang="en-US"/>
+          </a:p>
+        </p:txBody>
+      </p:sp>
+    </p:spTree>
+    <p:extLst>
+      <p:ext uri="{BB962C8B-B14F-4D97-AF65-F5344CB8AC3E}">
+        <p14:creationId xmlns:p14="http://schemas.microsoft.com/office/powerpoint/2010/main" val="4009143313"/>
+      </p:ext>
+    </p:extLst>
+  </p:cSld>
+  <p:clrMapOvr>
+    <a:masterClrMapping/>
+  </p:clrMapOvr>
+</p:notes>
+</file>
+
 <file path=ppt/slideLayouts/slideLayout1.xml><?xml version="1.0" encoding="utf-8"?>
 <p:sldLayout xmlns:a="http://schemas.openxmlformats.org/drawingml/2006/main" xmlns:r="http://schemas.openxmlformats.org/officeDocument/2006/relationships" xmlns:p="http://schemas.openxmlformats.org/presentationml/2006/main" type="title" preserve="1">
   <p:cSld name="Title Slide">
@@ -915,7 +1017,7 @@
           <a:p>
             <a:fld id="{3062C369-7AF3-492F-B6E6-C18714AB0AA8}" type="datetimeFigureOut">
               <a:rPr lang="en-US" smtClean="0"/>
-              <a:t>10/23/2025</a:t>
+              <a:t>10/31/2025</a:t>
             </a:fld>
             <a:endParaRPr lang="en-US"/>
           </a:p>
@@ -1113,7 +1215,7 @@
           <a:p>
             <a:fld id="{3062C369-7AF3-492F-B6E6-C18714AB0AA8}" type="datetimeFigureOut">
               <a:rPr lang="en-US" smtClean="0"/>
-              <a:t>10/23/2025</a:t>
+              <a:t>10/31/2025</a:t>
             </a:fld>
             <a:endParaRPr lang="en-US"/>
           </a:p>
@@ -1321,7 +1423,7 @@
           <a:p>
             <a:fld id="{3062C369-7AF3-492F-B6E6-C18714AB0AA8}" type="datetimeFigureOut">
               <a:rPr lang="en-US" smtClean="0"/>
-              <a:t>10/23/2025</a:t>
+              <a:t>10/31/2025</a:t>
             </a:fld>
             <a:endParaRPr lang="en-US"/>
           </a:p>
@@ -1519,7 +1621,7 @@
           <a:p>
             <a:fld id="{3062C369-7AF3-492F-B6E6-C18714AB0AA8}" type="datetimeFigureOut">
               <a:rPr lang="en-US" smtClean="0"/>
-              <a:t>10/23/2025</a:t>
+              <a:t>10/31/2025</a:t>
             </a:fld>
             <a:endParaRPr lang="en-US"/>
           </a:p>
@@ -1794,7 +1896,7 @@
           <a:p>
             <a:fld id="{3062C369-7AF3-492F-B6E6-C18714AB0AA8}" type="datetimeFigureOut">
               <a:rPr lang="en-US" smtClean="0"/>
-              <a:t>10/23/2025</a:t>
+              <a:t>10/31/2025</a:t>
             </a:fld>
             <a:endParaRPr lang="en-US"/>
           </a:p>
@@ -2059,7 +2161,7 @@
           <a:p>
             <a:fld id="{3062C369-7AF3-492F-B6E6-C18714AB0AA8}" type="datetimeFigureOut">
               <a:rPr lang="en-US" smtClean="0"/>
-              <a:t>10/23/2025</a:t>
+              <a:t>10/31/2025</a:t>
             </a:fld>
             <a:endParaRPr lang="en-US"/>
           </a:p>
@@ -2471,7 +2573,7 @@
           <a:p>
             <a:fld id="{3062C369-7AF3-492F-B6E6-C18714AB0AA8}" type="datetimeFigureOut">
               <a:rPr lang="en-US" smtClean="0"/>
-              <a:t>10/23/2025</a:t>
+              <a:t>10/31/2025</a:t>
             </a:fld>
             <a:endParaRPr lang="en-US"/>
           </a:p>
@@ -2612,7 +2714,7 @@
           <a:p>
             <a:fld id="{3062C369-7AF3-492F-B6E6-C18714AB0AA8}" type="datetimeFigureOut">
               <a:rPr lang="en-US" smtClean="0"/>
-              <a:t>10/23/2025</a:t>
+              <a:t>10/31/2025</a:t>
             </a:fld>
             <a:endParaRPr lang="en-US"/>
           </a:p>
@@ -2725,7 +2827,7 @@
           <a:p>
             <a:fld id="{3062C369-7AF3-492F-B6E6-C18714AB0AA8}" type="datetimeFigureOut">
               <a:rPr lang="en-US" smtClean="0"/>
-              <a:t>10/23/2025</a:t>
+              <a:t>10/31/2025</a:t>
             </a:fld>
             <a:endParaRPr lang="en-US"/>
           </a:p>
@@ -3036,7 +3138,7 @@
           <a:p>
             <a:fld id="{3062C369-7AF3-492F-B6E6-C18714AB0AA8}" type="datetimeFigureOut">
               <a:rPr lang="en-US" smtClean="0"/>
-              <a:t>10/23/2025</a:t>
+              <a:t>10/31/2025</a:t>
             </a:fld>
             <a:endParaRPr lang="en-US"/>
           </a:p>
@@ -3324,7 +3426,7 @@
           <a:p>
             <a:fld id="{3062C369-7AF3-492F-B6E6-C18714AB0AA8}" type="datetimeFigureOut">
               <a:rPr lang="en-US" smtClean="0"/>
-              <a:t>10/23/2025</a:t>
+              <a:t>10/31/2025</a:t>
             </a:fld>
             <a:endParaRPr lang="en-US"/>
           </a:p>
@@ -3565,7 +3667,7 @@
           <a:p>
             <a:fld id="{3062C369-7AF3-492F-B6E6-C18714AB0AA8}" type="datetimeFigureOut">
               <a:rPr lang="en-US" smtClean="0"/>
-              <a:t>10/23/2025</a:t>
+              <a:t>10/31/2025</a:t>
             </a:fld>
             <a:endParaRPr lang="en-US"/>
           </a:p>
@@ -5731,7 +5833,7 @@
             </a:extLst>
           </p:cNvPr>
           <p:cNvPicPr>
-            <a:picLocks noChangeAspect="1"/>
+            <a:picLocks noGrp="1" noChangeAspect="1"/>
           </p:cNvPicPr>
           <p:nvPr>
             <p:ph idx="1"/>
@@ -6889,7 +6991,9 @@
         </p:nvSpPr>
         <p:spPr/>
         <p:txBody>
-          <a:bodyPr/>
+          <a:bodyPr>
+            <a:normAutofit/>
+          </a:bodyPr>
           <a:lstStyle/>
           <a:p>
             <a:r>
@@ -6910,6 +7014,39 @@
               <a:rPr lang="en-US" dirty="0"/>
               <a:t>Use all frames in linear model and see how much it helps</a:t>
             </a:r>
+          </a:p>
+          <a:p>
+            <a:endParaRPr lang="en-US" dirty="0"/>
+          </a:p>
+          <a:p>
+            <a:r>
+              <a:rPr lang="en-US" dirty="0"/>
+              <a:t>Included all frames in regression model </a:t>
+            </a:r>
+          </a:p>
+          <a:p>
+            <a:pPr latinLnBrk="1"/>
+            <a:r>
+              <a:rPr lang="en-US" dirty="0"/>
+              <a:t>RMSE x: 7.446744 </a:t>
+            </a:r>
+          </a:p>
+          <a:p>
+            <a:pPr latinLnBrk="1"/>
+            <a:r>
+              <a:rPr lang="en-US" dirty="0"/>
+              <a:t>RMSE y: 4.650082 </a:t>
+            </a:r>
+          </a:p>
+          <a:p>
+            <a:pPr latinLnBrk="1"/>
+            <a:r>
+              <a:rPr lang="en-US" dirty="0"/>
+              <a:t>Overall RMSE: 8.779365 </a:t>
+            </a:r>
+          </a:p>
+          <a:p>
+            <a:endParaRPr lang="en-US" dirty="0"/>
           </a:p>
         </p:txBody>
       </p:sp>
@@ -6917,6 +7054,828 @@
     <p:extLst>
       <p:ext uri="{BB962C8B-B14F-4D97-AF65-F5344CB8AC3E}">
         <p14:creationId xmlns:p14="http://schemas.microsoft.com/office/powerpoint/2010/main" val="1007713167"/>
+      </p:ext>
+    </p:extLst>
+  </p:cSld>
+  <p:clrMapOvr>
+    <a:masterClrMapping/>
+  </p:clrMapOvr>
+</p:sld>
+</file>
+
+<file path=ppt/slides/slide22.xml><?xml version="1.0" encoding="utf-8"?>
+<p:sld xmlns:a="http://schemas.openxmlformats.org/drawingml/2006/main" xmlns:r="http://schemas.openxmlformats.org/officeDocument/2006/relationships" xmlns:p="http://schemas.openxmlformats.org/presentationml/2006/main">
+  <p:cSld>
+    <p:spTree>
+      <p:nvGrpSpPr>
+        <p:cNvPr id="1" name=""/>
+        <p:cNvGrpSpPr/>
+        <p:nvPr/>
+      </p:nvGrpSpPr>
+      <p:grpSpPr>
+        <a:xfrm>
+          <a:off x="0" y="0"/>
+          <a:ext cx="0" cy="0"/>
+          <a:chOff x="0" y="0"/>
+          <a:chExt cx="0" cy="0"/>
+        </a:xfrm>
+      </p:grpSpPr>
+      <p:sp>
+        <p:nvSpPr>
+          <p:cNvPr id="2" name="Title 1">
+            <a:extLst>
+              <a:ext uri="{FF2B5EF4-FFF2-40B4-BE49-F238E27FC236}">
+                <a16:creationId xmlns:a16="http://schemas.microsoft.com/office/drawing/2014/main" id="{47C5F7FB-5F3B-625F-EAE4-DBD022BA0001}"/>
+              </a:ext>
+            </a:extLst>
+          </p:cNvPr>
+          <p:cNvSpPr>
+            <a:spLocks noGrp="1"/>
+          </p:cNvSpPr>
+          <p:nvPr>
+            <p:ph type="title"/>
+          </p:nvPr>
+        </p:nvSpPr>
+        <p:spPr/>
+        <p:txBody>
+          <a:bodyPr/>
+          <a:lstStyle/>
+          <a:p>
+            <a:r>
+              <a:rPr lang="en-US" dirty="0" err="1"/>
+              <a:t>Multivaraite</a:t>
+            </a:r>
+            <a:r>
+              <a:rPr lang="en-US" dirty="0"/>
+              <a:t> regression model</a:t>
+            </a:r>
+          </a:p>
+        </p:txBody>
+      </p:sp>
+      <p:sp>
+        <p:nvSpPr>
+          <p:cNvPr id="4" name="Rectangle 1">
+            <a:extLst>
+              <a:ext uri="{FF2B5EF4-FFF2-40B4-BE49-F238E27FC236}">
+                <a16:creationId xmlns:a16="http://schemas.microsoft.com/office/drawing/2014/main" id="{2D363B25-4994-B139-0DF5-825BCF63586B}"/>
+              </a:ext>
+            </a:extLst>
+          </p:cNvPr>
+          <p:cNvSpPr>
+            <a:spLocks noGrp="1" noChangeArrowheads="1"/>
+          </p:cNvSpPr>
+          <p:nvPr>
+            <p:ph idx="1"/>
+          </p:nvPr>
+        </p:nvSpPr>
+        <p:spPr bwMode="auto">
+          <a:xfrm>
+            <a:off x="348359" y="2152354"/>
+            <a:ext cx="11495282" cy="2862322"/>
+          </a:xfrm>
+          <a:prstGeom prst="rect">
+            <a:avLst/>
+          </a:prstGeom>
+          <a:noFill/>
+          <a:ln>
+            <a:noFill/>
+          </a:ln>
+          <a:effectLst/>
+          <a:extLst>
+            <a:ext uri="{909E8E84-426E-40DD-AFC4-6F175D3DCCD1}">
+              <a14:hiddenFill xmlns:a14="http://schemas.microsoft.com/office/drawing/2010/main">
+                <a:solidFill>
+                  <a:schemeClr val="accent1"/>
+                </a:solidFill>
+              </a14:hiddenFill>
+            </a:ext>
+            <a:ext uri="{91240B29-F687-4F45-9708-019B960494DF}">
+              <a14:hiddenLine xmlns:a14="http://schemas.microsoft.com/office/drawing/2010/main" w="9525">
+                <a:solidFill>
+                  <a:schemeClr val="tx1"/>
+                </a:solidFill>
+                <a:miter lim="800000"/>
+                <a:headEnd/>
+                <a:tailEnd/>
+              </a14:hiddenLine>
+            </a:ext>
+            <a:ext uri="{AF507438-7753-43E0-B8FC-AC1667EBCBE1}">
+              <a14:hiddenEffects xmlns:a14="http://schemas.microsoft.com/office/drawing/2010/main">
+                <a:effectLst>
+                  <a:outerShdw dist="35921" dir="2700000" algn="ctr" rotWithShape="0">
+                    <a:schemeClr val="bg2"/>
+                  </a:outerShdw>
+                </a:effectLst>
+              </a14:hiddenEffects>
+            </a:ext>
+          </a:extLst>
+        </p:spPr>
+        <p:txBody>
+          <a:bodyPr vert="horz" wrap="square" lIns="91440" tIns="45720" rIns="91440" bIns="45720" numCol="1" anchor="ctr" anchorCtr="0" compatLnSpc="1">
+            <a:prstTxWarp prst="textNoShape">
+              <a:avLst/>
+            </a:prstTxWarp>
+            <a:spAutoFit/>
+          </a:bodyPr>
+          <a:lstStyle/>
+          <a:p>
+            <a:pPr marL="0" marR="0" lvl="0" indent="0" algn="l" defTabSz="914400" rtl="0" eaLnBrk="0" fontAlgn="base" latinLnBrk="0" hangingPunct="0">
+              <a:lnSpc>
+                <a:spcPct val="100000"/>
+              </a:lnSpc>
+              <a:spcBef>
+                <a:spcPct val="0"/>
+              </a:spcBef>
+              <a:spcAft>
+                <a:spcPct val="0"/>
+              </a:spcAft>
+              <a:buClrTx/>
+              <a:buSzTx/>
+              <a:buFontTx/>
+              <a:buChar char="•"/>
+              <a:tabLst/>
+            </a:pPr>
+            <a:r>
+              <a:rPr kumimoji="0" lang="en-US" altLang="en-US" sz="1800" b="1" i="0" u="none" strike="noStrike" cap="none" normalizeH="0" baseline="0" dirty="0">
+                <a:ln>
+                  <a:noFill/>
+                </a:ln>
+                <a:solidFill>
+                  <a:schemeClr val="tx1"/>
+                </a:solidFill>
+                <a:effectLst/>
+              </a:rPr>
+              <a:t>Joint (multivariate) model:</a:t>
+            </a:r>
+            <a:br>
+              <a:rPr kumimoji="0" lang="en-US" altLang="en-US" sz="1800" b="0" i="0" u="none" strike="noStrike" cap="none" normalizeH="0" baseline="0" dirty="0">
+                <a:ln>
+                  <a:noFill/>
+                </a:ln>
+                <a:solidFill>
+                  <a:schemeClr val="tx1"/>
+                </a:solidFill>
+                <a:effectLst/>
+              </a:rPr>
+            </a:br>
+            <a:r>
+              <a:rPr kumimoji="0" lang="en-US" altLang="en-US" sz="1800" b="0" i="0" u="none" strike="noStrike" cap="none" normalizeH="0" baseline="0" dirty="0">
+                <a:ln>
+                  <a:noFill/>
+                </a:ln>
+                <a:solidFill>
+                  <a:schemeClr val="tx1"/>
+                </a:solidFill>
+                <a:effectLst/>
+              </a:rPr>
+              <a:t>Instead of two separate linear regressions (</a:t>
+            </a:r>
+            <a:r>
+              <a:rPr kumimoji="0" lang="en-US" altLang="en-US" sz="1800" b="0" i="0" u="none" strike="noStrike" cap="none" normalizeH="0" baseline="0" dirty="0" err="1">
+                <a:ln>
+                  <a:noFill/>
+                </a:ln>
+                <a:solidFill>
+                  <a:schemeClr val="tx1"/>
+                </a:solidFill>
+                <a:effectLst/>
+              </a:rPr>
+              <a:t>x_next</a:t>
+            </a:r>
+            <a:r>
+              <a:rPr kumimoji="0" lang="en-US" altLang="en-US" sz="1800" b="0" i="0" u="none" strike="noStrike" cap="none" normalizeH="0" baseline="0" dirty="0">
+                <a:ln>
+                  <a:noFill/>
+                </a:ln>
+                <a:solidFill>
+                  <a:schemeClr val="tx1"/>
+                </a:solidFill>
+                <a:effectLst/>
+              </a:rPr>
+              <a:t> and </a:t>
+            </a:r>
+            <a:r>
+              <a:rPr kumimoji="0" lang="en-US" altLang="en-US" sz="1800" b="0" i="0" u="none" strike="noStrike" cap="none" normalizeH="0" baseline="0" dirty="0" err="1">
+                <a:ln>
+                  <a:noFill/>
+                </a:ln>
+                <a:solidFill>
+                  <a:schemeClr val="tx1"/>
+                </a:solidFill>
+                <a:effectLst/>
+              </a:rPr>
+              <a:t>y_next</a:t>
+            </a:r>
+            <a:r>
+              <a:rPr kumimoji="0" lang="en-US" altLang="en-US" sz="1800" b="0" i="0" u="none" strike="noStrike" cap="none" normalizeH="0" baseline="0" dirty="0">
+                <a:ln>
+                  <a:noFill/>
+                </a:ln>
+                <a:solidFill>
+                  <a:schemeClr val="tx1"/>
+                </a:solidFill>
+                <a:effectLst/>
+              </a:rPr>
+              <a:t>), we use one model with </a:t>
+            </a:r>
+            <a:r>
+              <a:rPr kumimoji="0" lang="en-US" altLang="en-US" sz="1800" b="0" i="0" u="none" strike="noStrike" cap="none" normalizeH="0" baseline="0" dirty="0" err="1">
+                <a:ln>
+                  <a:noFill/>
+                </a:ln>
+                <a:solidFill>
+                  <a:schemeClr val="tx1"/>
+                </a:solidFill>
+                <a:effectLst/>
+              </a:rPr>
+              <a:t>cbind</a:t>
+            </a:r>
+            <a:r>
+              <a:rPr kumimoji="0" lang="en-US" altLang="en-US" sz="1800" b="0" i="0" u="none" strike="noStrike" cap="none" normalizeH="0" baseline="0" dirty="0">
+                <a:ln>
+                  <a:noFill/>
+                </a:ln>
+                <a:solidFill>
+                  <a:schemeClr val="tx1"/>
+                </a:solidFill>
+                <a:effectLst/>
+              </a:rPr>
+              <a:t>(</a:t>
+            </a:r>
+            <a:r>
+              <a:rPr kumimoji="0" lang="en-US" altLang="en-US" sz="1800" b="0" i="0" u="none" strike="noStrike" cap="none" normalizeH="0" baseline="0" dirty="0" err="1">
+                <a:ln>
+                  <a:noFill/>
+                </a:ln>
+                <a:solidFill>
+                  <a:schemeClr val="tx1"/>
+                </a:solidFill>
+                <a:effectLst/>
+              </a:rPr>
+              <a:t>x_next</a:t>
+            </a:r>
+            <a:r>
+              <a:rPr kumimoji="0" lang="en-US" altLang="en-US" sz="1800" b="0" i="0" u="none" strike="noStrike" cap="none" normalizeH="0" baseline="0" dirty="0">
+                <a:ln>
+                  <a:noFill/>
+                </a:ln>
+                <a:solidFill>
+                  <a:schemeClr val="tx1"/>
+                </a:solidFill>
+                <a:effectLst/>
+              </a:rPr>
+              <a:t>, </a:t>
+            </a:r>
+            <a:r>
+              <a:rPr kumimoji="0" lang="en-US" altLang="en-US" sz="1800" b="0" i="0" u="none" strike="noStrike" cap="none" normalizeH="0" baseline="0" dirty="0" err="1">
+                <a:ln>
+                  <a:noFill/>
+                </a:ln>
+                <a:solidFill>
+                  <a:schemeClr val="tx1"/>
+                </a:solidFill>
+                <a:effectLst/>
+              </a:rPr>
+              <a:t>y_next</a:t>
+            </a:r>
+            <a:r>
+              <a:rPr kumimoji="0" lang="en-US" altLang="en-US" sz="1800" b="0" i="0" u="none" strike="noStrike" cap="none" normalizeH="0" baseline="0" dirty="0">
+                <a:ln>
+                  <a:noFill/>
+                </a:ln>
+                <a:solidFill>
+                  <a:schemeClr val="tx1"/>
+                </a:solidFill>
+                <a:effectLst/>
+              </a:rPr>
+              <a:t>) as the response.</a:t>
+            </a:r>
+            <a:br>
+              <a:rPr kumimoji="0" lang="en-US" altLang="en-US" sz="1800" b="0" i="0" u="none" strike="noStrike" cap="none" normalizeH="0" baseline="0" dirty="0">
+                <a:ln>
+                  <a:noFill/>
+                </a:ln>
+                <a:solidFill>
+                  <a:schemeClr val="tx1"/>
+                </a:solidFill>
+                <a:effectLst/>
+              </a:rPr>
+            </a:br>
+            <a:r>
+              <a:rPr kumimoji="0" lang="en-US" altLang="en-US" sz="1800" b="0" i="0" u="none" strike="noStrike" cap="none" normalizeH="0" baseline="0" dirty="0">
+                <a:ln>
+                  <a:noFill/>
+                </a:ln>
+                <a:solidFill>
+                  <a:schemeClr val="tx1"/>
+                </a:solidFill>
+                <a:effectLst/>
+              </a:rPr>
+              <a:t>This captures </a:t>
+            </a:r>
+            <a:r>
+              <a:rPr kumimoji="0" lang="en-US" altLang="en-US" sz="1800" b="1" i="0" u="none" strike="noStrike" cap="none" normalizeH="0" baseline="0" dirty="0">
+                <a:ln>
+                  <a:noFill/>
+                </a:ln>
+                <a:solidFill>
+                  <a:schemeClr val="tx1"/>
+                </a:solidFill>
+                <a:effectLst/>
+              </a:rPr>
+              <a:t>covariance between X and Y movement</a:t>
+            </a:r>
+            <a:r>
+              <a:rPr kumimoji="0" lang="en-US" altLang="en-US" sz="1800" b="0" i="0" u="none" strike="noStrike" cap="none" normalizeH="0" baseline="0" dirty="0">
+                <a:ln>
+                  <a:noFill/>
+                </a:ln>
+                <a:solidFill>
+                  <a:schemeClr val="tx1"/>
+                </a:solidFill>
+                <a:effectLst/>
+              </a:rPr>
+              <a:t>, something a true multivariate regression can model.</a:t>
+            </a:r>
+          </a:p>
+          <a:p>
+            <a:pPr marL="0" marR="0" lvl="0" indent="0" algn="l" defTabSz="914400" rtl="0" eaLnBrk="0" fontAlgn="base" latinLnBrk="0" hangingPunct="0">
+              <a:lnSpc>
+                <a:spcPct val="100000"/>
+              </a:lnSpc>
+              <a:spcBef>
+                <a:spcPct val="0"/>
+              </a:spcBef>
+              <a:spcAft>
+                <a:spcPct val="0"/>
+              </a:spcAft>
+              <a:buClrTx/>
+              <a:buSzTx/>
+              <a:buFontTx/>
+              <a:buChar char="•"/>
+              <a:tabLst/>
+            </a:pPr>
+            <a:r>
+              <a:rPr kumimoji="0" lang="en-US" altLang="en-US" sz="1800" b="1" i="0" u="none" strike="noStrike" cap="none" normalizeH="0" baseline="0" dirty="0">
+                <a:ln>
+                  <a:noFill/>
+                </a:ln>
+                <a:solidFill>
+                  <a:schemeClr val="tx1"/>
+                </a:solidFill>
+                <a:effectLst/>
+              </a:rPr>
+              <a:t>Dynamic past feature construction:</a:t>
+            </a:r>
+            <a:br>
+              <a:rPr kumimoji="0" lang="en-US" altLang="en-US" sz="1800" b="0" i="0" u="none" strike="noStrike" cap="none" normalizeH="0" baseline="0" dirty="0">
+                <a:ln>
+                  <a:noFill/>
+                </a:ln>
+                <a:solidFill>
+                  <a:schemeClr val="tx1"/>
+                </a:solidFill>
+                <a:effectLst/>
+              </a:rPr>
+            </a:br>
+            <a:r>
+              <a:rPr kumimoji="0" lang="en-US" altLang="en-US" sz="1800" b="0" i="0" u="none" strike="noStrike" cap="none" normalizeH="0" baseline="0" dirty="0">
+                <a:ln>
+                  <a:noFill/>
+                </a:ln>
+                <a:solidFill>
+                  <a:schemeClr val="tx1"/>
+                </a:solidFill>
+                <a:effectLst/>
+              </a:rPr>
+              <a:t>Keeps your loop for all frames but ensures the first frame is safely initialized and NAs don’t propagate.</a:t>
+            </a:r>
+          </a:p>
+          <a:p>
+            <a:pPr marL="0" marR="0" lvl="0" indent="0" algn="l" defTabSz="914400" rtl="0" eaLnBrk="0" fontAlgn="base" latinLnBrk="0" hangingPunct="0">
+              <a:lnSpc>
+                <a:spcPct val="100000"/>
+              </a:lnSpc>
+              <a:spcBef>
+                <a:spcPct val="0"/>
+              </a:spcBef>
+              <a:spcAft>
+                <a:spcPct val="0"/>
+              </a:spcAft>
+              <a:buClrTx/>
+              <a:buSzTx/>
+              <a:buFontTx/>
+              <a:buChar char="•"/>
+              <a:tabLst/>
+            </a:pPr>
+            <a:r>
+              <a:rPr kumimoji="0" lang="en-US" altLang="en-US" sz="1800" b="1" i="0" u="none" strike="noStrike" cap="none" normalizeH="0" baseline="0" dirty="0">
+                <a:ln>
+                  <a:noFill/>
+                </a:ln>
+                <a:solidFill>
+                  <a:schemeClr val="tx1"/>
+                </a:solidFill>
+                <a:effectLst/>
+              </a:rPr>
+              <a:t>Prediction fallback:</a:t>
+            </a:r>
+            <a:br>
+              <a:rPr kumimoji="0" lang="en-US" altLang="en-US" sz="1800" b="0" i="0" u="none" strike="noStrike" cap="none" normalizeH="0" baseline="0" dirty="0">
+                <a:ln>
+                  <a:noFill/>
+                </a:ln>
+                <a:solidFill>
+                  <a:schemeClr val="tx1"/>
+                </a:solidFill>
+                <a:effectLst/>
+              </a:rPr>
+            </a:br>
+            <a:r>
+              <a:rPr kumimoji="0" lang="en-US" altLang="en-US" sz="1800" b="0" i="0" u="none" strike="noStrike" cap="none" normalizeH="0" baseline="0" dirty="0">
+                <a:ln>
+                  <a:noFill/>
+                </a:ln>
+                <a:solidFill>
+                  <a:schemeClr val="tx1"/>
+                </a:solidFill>
+                <a:effectLst/>
+              </a:rPr>
+              <a:t>If </a:t>
+            </a:r>
+            <a:r>
+              <a:rPr kumimoji="0" lang="en-US" altLang="en-US" sz="1800" b="0" i="0" u="none" strike="noStrike" cap="none" normalizeH="0" baseline="0" dirty="0" err="1">
+                <a:ln>
+                  <a:noFill/>
+                </a:ln>
+                <a:solidFill>
+                  <a:schemeClr val="tx1"/>
+                </a:solidFill>
+                <a:effectLst/>
+              </a:rPr>
+              <a:t>n_past</a:t>
+            </a:r>
+            <a:r>
+              <a:rPr kumimoji="0" lang="en-US" altLang="en-US" sz="1800" b="0" i="0" u="none" strike="noStrike" cap="none" normalizeH="0" baseline="0" dirty="0">
+                <a:ln>
+                  <a:noFill/>
+                </a:ln>
+                <a:solidFill>
+                  <a:schemeClr val="tx1"/>
+                </a:solidFill>
+                <a:effectLst/>
+              </a:rPr>
+              <a:t> is 0 (first frame), the model still gives a physics-based estimate (x + </a:t>
+            </a:r>
+            <a:r>
+              <a:rPr kumimoji="0" lang="en-US" altLang="en-US" sz="1800" b="0" i="0" u="none" strike="noStrike" cap="none" normalizeH="0" baseline="0" dirty="0" err="1">
+                <a:ln>
+                  <a:noFill/>
+                </a:ln>
+                <a:solidFill>
+                  <a:schemeClr val="tx1"/>
+                </a:solidFill>
+                <a:effectLst/>
+              </a:rPr>
+              <a:t>vx</a:t>
+            </a:r>
+            <a:r>
+              <a:rPr kumimoji="0" lang="en-US" altLang="en-US" sz="1800" b="0" i="0" u="none" strike="noStrike" cap="none" normalizeH="0" baseline="0" dirty="0">
+                <a:ln>
+                  <a:noFill/>
+                </a:ln>
+                <a:solidFill>
+                  <a:schemeClr val="tx1"/>
+                </a:solidFill>
+                <a:effectLst/>
+              </a:rPr>
+              <a:t>, y + </a:t>
+            </a:r>
+            <a:r>
+              <a:rPr kumimoji="0" lang="en-US" altLang="en-US" sz="1800" b="0" i="0" u="none" strike="noStrike" cap="none" normalizeH="0" baseline="0" dirty="0" err="1">
+                <a:ln>
+                  <a:noFill/>
+                </a:ln>
+                <a:solidFill>
+                  <a:schemeClr val="tx1"/>
+                </a:solidFill>
+                <a:effectLst/>
+              </a:rPr>
+              <a:t>vy</a:t>
+            </a:r>
+            <a:r>
+              <a:rPr kumimoji="0" lang="en-US" altLang="en-US" sz="1800" b="0" i="0" u="none" strike="noStrike" cap="none" normalizeH="0" baseline="0" dirty="0">
+                <a:ln>
+                  <a:noFill/>
+                </a:ln>
+                <a:solidFill>
+                  <a:schemeClr val="tx1"/>
+                </a:solidFill>
+                <a:effectLst/>
+              </a:rPr>
+              <a:t>).</a:t>
+            </a:r>
+          </a:p>
+          <a:p>
+            <a:pPr marL="0" marR="0" lvl="0" indent="0" algn="l" defTabSz="914400" rtl="0" eaLnBrk="0" fontAlgn="base" latinLnBrk="0" hangingPunct="0">
+              <a:lnSpc>
+                <a:spcPct val="100000"/>
+              </a:lnSpc>
+              <a:spcBef>
+                <a:spcPct val="0"/>
+              </a:spcBef>
+              <a:spcAft>
+                <a:spcPct val="0"/>
+              </a:spcAft>
+              <a:buClrTx/>
+              <a:buSzTx/>
+              <a:buFontTx/>
+              <a:buChar char="•"/>
+              <a:tabLst/>
+            </a:pPr>
+            <a:r>
+              <a:rPr kumimoji="0" lang="en-US" altLang="en-US" sz="1800" b="1" i="0" u="none" strike="noStrike" cap="none" normalizeH="0" baseline="0" dirty="0">
+                <a:ln>
+                  <a:noFill/>
+                </a:ln>
+                <a:solidFill>
+                  <a:schemeClr val="tx1"/>
+                </a:solidFill>
+                <a:effectLst/>
+              </a:rPr>
+              <a:t>Cleaner structure:</a:t>
+            </a:r>
+            <a:br>
+              <a:rPr kumimoji="0" lang="en-US" altLang="en-US" sz="1800" b="0" i="0" u="none" strike="noStrike" cap="none" normalizeH="0" baseline="0" dirty="0">
+                <a:ln>
+                  <a:noFill/>
+                </a:ln>
+                <a:solidFill>
+                  <a:schemeClr val="tx1"/>
+                </a:solidFill>
+                <a:effectLst/>
+              </a:rPr>
+            </a:br>
+            <a:r>
+              <a:rPr kumimoji="0" lang="en-US" altLang="en-US" sz="1800" b="0" i="0" u="none" strike="noStrike" cap="none" normalizeH="0" baseline="0" dirty="0">
+                <a:ln>
+                  <a:noFill/>
+                </a:ln>
+                <a:solidFill>
+                  <a:schemeClr val="tx1"/>
+                </a:solidFill>
+                <a:effectLst/>
+              </a:rPr>
+              <a:t>Split into clear steps for interpretability.</a:t>
+            </a:r>
+          </a:p>
+        </p:txBody>
+      </p:sp>
+    </p:spTree>
+    <p:extLst>
+      <p:ext uri="{BB962C8B-B14F-4D97-AF65-F5344CB8AC3E}">
+        <p14:creationId xmlns:p14="http://schemas.microsoft.com/office/powerpoint/2010/main" val="3585613456"/>
+      </p:ext>
+    </p:extLst>
+  </p:cSld>
+  <p:clrMapOvr>
+    <a:masterClrMapping/>
+  </p:clrMapOvr>
+</p:sld>
+</file>
+
+<file path=ppt/slides/slide23.xml><?xml version="1.0" encoding="utf-8"?>
+<p:sld xmlns:a="http://schemas.openxmlformats.org/drawingml/2006/main" xmlns:r="http://schemas.openxmlformats.org/officeDocument/2006/relationships" xmlns:p="http://schemas.openxmlformats.org/presentationml/2006/main">
+  <p:cSld>
+    <p:spTree>
+      <p:nvGrpSpPr>
+        <p:cNvPr id="1" name=""/>
+        <p:cNvGrpSpPr/>
+        <p:nvPr/>
+      </p:nvGrpSpPr>
+      <p:grpSpPr>
+        <a:xfrm>
+          <a:off x="0" y="0"/>
+          <a:ext cx="0" cy="0"/>
+          <a:chOff x="0" y="0"/>
+          <a:chExt cx="0" cy="0"/>
+        </a:xfrm>
+      </p:grpSpPr>
+      <p:sp>
+        <p:nvSpPr>
+          <p:cNvPr id="2" name="Title 1">
+            <a:extLst>
+              <a:ext uri="{FF2B5EF4-FFF2-40B4-BE49-F238E27FC236}">
+                <a16:creationId xmlns:a16="http://schemas.microsoft.com/office/drawing/2014/main" id="{C625AB28-A713-206F-A3EE-CD142688CA6D}"/>
+              </a:ext>
+            </a:extLst>
+          </p:cNvPr>
+          <p:cNvSpPr>
+            <a:spLocks noGrp="1"/>
+          </p:cNvSpPr>
+          <p:nvPr>
+            <p:ph type="title"/>
+          </p:nvPr>
+        </p:nvSpPr>
+        <p:spPr/>
+        <p:txBody>
+          <a:bodyPr/>
+          <a:lstStyle/>
+          <a:p>
+            <a:r>
+              <a:rPr lang="en-US" dirty="0"/>
+              <a:t>LSTM – whole season</a:t>
+            </a:r>
+          </a:p>
+        </p:txBody>
+      </p:sp>
+      <p:sp>
+        <p:nvSpPr>
+          <p:cNvPr id="3" name="Content Placeholder 2">
+            <a:extLst>
+              <a:ext uri="{FF2B5EF4-FFF2-40B4-BE49-F238E27FC236}">
+                <a16:creationId xmlns:a16="http://schemas.microsoft.com/office/drawing/2014/main" id="{1CE0ED20-DEAA-8CC2-FD86-72A15EF7BBC8}"/>
+              </a:ext>
+            </a:extLst>
+          </p:cNvPr>
+          <p:cNvSpPr>
+            <a:spLocks noGrp="1"/>
+          </p:cNvSpPr>
+          <p:nvPr>
+            <p:ph idx="1"/>
+          </p:nvPr>
+        </p:nvSpPr>
+        <p:spPr/>
+        <p:txBody>
+          <a:bodyPr/>
+          <a:lstStyle/>
+          <a:p>
+            <a:r>
+              <a:rPr lang="en-US" dirty="0"/>
+              <a:t>Prefers a lot of data</a:t>
+            </a:r>
+          </a:p>
+          <a:p>
+            <a:r>
+              <a:rPr lang="en-US" dirty="0"/>
+              <a:t>Well with kinematic</a:t>
+            </a:r>
+          </a:p>
+          <a:p>
+            <a:r>
+              <a:rPr lang="en-US" dirty="0"/>
+              <a:t>Not maintaining the momentum of the players</a:t>
+            </a:r>
+          </a:p>
+        </p:txBody>
+      </p:sp>
+    </p:spTree>
+    <p:extLst>
+      <p:ext uri="{BB962C8B-B14F-4D97-AF65-F5344CB8AC3E}">
+        <p14:creationId xmlns:p14="http://schemas.microsoft.com/office/powerpoint/2010/main" val="2242612171"/>
+      </p:ext>
+    </p:extLst>
+  </p:cSld>
+  <p:clrMapOvr>
+    <a:masterClrMapping/>
+  </p:clrMapOvr>
+</p:sld>
+</file>
+
+<file path=ppt/slides/slide24.xml><?xml version="1.0" encoding="utf-8"?>
+<p:sld xmlns:a="http://schemas.openxmlformats.org/drawingml/2006/main" xmlns:r="http://schemas.openxmlformats.org/officeDocument/2006/relationships" xmlns:p="http://schemas.openxmlformats.org/presentationml/2006/main">
+  <p:cSld>
+    <p:spTree>
+      <p:nvGrpSpPr>
+        <p:cNvPr id="1" name=""/>
+        <p:cNvGrpSpPr/>
+        <p:nvPr/>
+      </p:nvGrpSpPr>
+      <p:grpSpPr>
+        <a:xfrm>
+          <a:off x="0" y="0"/>
+          <a:ext cx="0" cy="0"/>
+          <a:chOff x="0" y="0"/>
+          <a:chExt cx="0" cy="0"/>
+        </a:xfrm>
+      </p:grpSpPr>
+      <p:sp>
+        <p:nvSpPr>
+          <p:cNvPr id="2" name="Title 1">
+            <a:extLst>
+              <a:ext uri="{FF2B5EF4-FFF2-40B4-BE49-F238E27FC236}">
+                <a16:creationId xmlns:a16="http://schemas.microsoft.com/office/drawing/2014/main" id="{75242767-18F9-AF9A-B4C2-879E5E2D0633}"/>
+              </a:ext>
+            </a:extLst>
+          </p:cNvPr>
+          <p:cNvSpPr>
+            <a:spLocks noGrp="1"/>
+          </p:cNvSpPr>
+          <p:nvPr>
+            <p:ph type="title"/>
+          </p:nvPr>
+        </p:nvSpPr>
+        <p:spPr/>
+        <p:txBody>
+          <a:bodyPr/>
+          <a:lstStyle/>
+          <a:p>
+            <a:r>
+              <a:rPr lang="en-US" dirty="0"/>
+              <a:t>10 /30 mtg</a:t>
+            </a:r>
+          </a:p>
+        </p:txBody>
+      </p:sp>
+      <p:sp>
+        <p:nvSpPr>
+          <p:cNvPr id="3" name="Content Placeholder 2">
+            <a:extLst>
+              <a:ext uri="{FF2B5EF4-FFF2-40B4-BE49-F238E27FC236}">
+                <a16:creationId xmlns:a16="http://schemas.microsoft.com/office/drawing/2014/main" id="{F1F33B69-9E6F-DD2C-5B44-40AFC2DCB5D9}"/>
+              </a:ext>
+            </a:extLst>
+          </p:cNvPr>
+          <p:cNvSpPr>
+            <a:spLocks noGrp="1"/>
+          </p:cNvSpPr>
+          <p:nvPr>
+            <p:ph idx="1"/>
+          </p:nvPr>
+        </p:nvSpPr>
+        <p:spPr/>
+        <p:txBody>
+          <a:bodyPr/>
+          <a:lstStyle/>
+          <a:p>
+            <a:pPr>
+              <a:buFontTx/>
+              <a:buChar char="-"/>
+            </a:pPr>
+            <a:r>
+              <a:rPr lang="en-US" dirty="0"/>
+              <a:t>Make ball location relevant information</a:t>
+            </a:r>
+          </a:p>
+          <a:p>
+            <a:pPr>
+              <a:buFontTx/>
+              <a:buChar char="-"/>
+            </a:pPr>
+            <a:r>
+              <a:rPr lang="en-US" dirty="0"/>
+              <a:t>Week 9 chiefs vs dolphins (Germany game)</a:t>
+            </a:r>
+          </a:p>
+          <a:p>
+            <a:pPr>
+              <a:buFontTx/>
+              <a:buChar char="-"/>
+            </a:pPr>
+            <a:r>
+              <a:rPr lang="en-US" dirty="0"/>
+              <a:t>Interactions </a:t>
+            </a:r>
+          </a:p>
+          <a:p>
+            <a:pPr>
+              <a:buFontTx/>
+              <a:buChar char="-"/>
+            </a:pPr>
+            <a:r>
+              <a:rPr lang="en-US" dirty="0"/>
+              <a:t>Data cleaning?</a:t>
+            </a:r>
+          </a:p>
+          <a:p>
+            <a:pPr>
+              <a:buFontTx/>
+              <a:buChar char="-"/>
+            </a:pPr>
+            <a:r>
+              <a:rPr lang="en-US" dirty="0"/>
+              <a:t>Upload multivariate model for </a:t>
+            </a:r>
+            <a:r>
+              <a:rPr lang="en-US" dirty="0" err="1"/>
+              <a:t>walter</a:t>
+            </a:r>
+            <a:r>
+              <a:rPr lang="en-US" dirty="0"/>
+              <a:t> so he can get week 9 game </a:t>
+            </a:r>
+            <a:r>
+              <a:rPr lang="en-US"/>
+              <a:t>interactions figured out</a:t>
+            </a:r>
+            <a:endParaRPr lang="en-US" dirty="0"/>
+          </a:p>
+        </p:txBody>
+      </p:sp>
+    </p:spTree>
+    <p:extLst>
+      <p:ext uri="{BB962C8B-B14F-4D97-AF65-F5344CB8AC3E}">
+        <p14:creationId xmlns:p14="http://schemas.microsoft.com/office/powerpoint/2010/main" val="423893388"/>
       </p:ext>
     </p:extLst>
   </p:cSld>

</xml_diff>